<commit_message>
Segunda modificación de presentación
</commit_message>
<xml_diff>
--- a/PresentacionAlmacen.pptx
+++ b/PresentacionAlmacen.pptx
@@ -8189,7 +8189,7 @@
         </p:blipFill>
         <p:spPr>
           <a:xfrm>
-            <a:off x="20" y="10"/>
+            <a:off x="-2" y="-24382"/>
             <a:ext cx="12191962" cy="6857990"/>
           </a:xfrm>
           <a:prstGeom prst="rect">
@@ -8293,27 +8293,61 @@
         </p:nvSpPr>
         <p:spPr>
           <a:xfrm>
-            <a:off x="848696" y="1371600"/>
-            <a:ext cx="7753235" cy="3948621"/>
+            <a:off x="2294647" y="1633680"/>
+            <a:ext cx="7602664" cy="2731618"/>
           </a:xfrm>
         </p:spPr>
         <p:txBody>
           <a:bodyPr anchor="b">
-            <a:normAutofit/>
+            <a:normAutofit fontScale="90000"/>
           </a:bodyPr>
           <a:lstStyle/>
           <a:p>
-            <a:pPr algn="l"/>
             <a:r>
-              <a:rPr lang="es-ES">
+              <a:rPr lang="es-ES" dirty="0">
                 <a:solidFill>
                   <a:srgbClr val="FFFFFF"/>
                 </a:solidFill>
-                <a:latin typeface="Arial" panose="020B0604020202020204" pitchFamily="34" charset="0"/>
+                <a:latin typeface="Comic Sans MS" panose="030F0702030302020204" pitchFamily="66" charset="0"/>
                 <a:cs typeface="Arial" panose="020B0604020202020204" pitchFamily="34" charset="0"/>
               </a:rPr>
-              <a:t>Desarrollo de un Servicio API REST con .NET Framework y MySql</a:t>
+              <a:t>Servicio API REST con .NET Framework</a:t>
             </a:r>
+            <a:br>
+              <a:rPr lang="es-ES" dirty="0">
+                <a:solidFill>
+                  <a:srgbClr val="FFFFFF"/>
+                </a:solidFill>
+                <a:latin typeface="Comic Sans MS" panose="030F0702030302020204" pitchFamily="66" charset="0"/>
+                <a:cs typeface="Arial" panose="020B0604020202020204" pitchFamily="34" charset="0"/>
+              </a:rPr>
+            </a:br>
+            <a:br>
+              <a:rPr lang="es-ES" dirty="0">
+                <a:solidFill>
+                  <a:srgbClr val="FFFFFF"/>
+                </a:solidFill>
+                <a:latin typeface="Comic Sans MS" panose="030F0702030302020204" pitchFamily="66" charset="0"/>
+                <a:cs typeface="Arial" panose="020B0604020202020204" pitchFamily="34" charset="0"/>
+              </a:rPr>
+            </a:br>
+            <a:r>
+              <a:rPr lang="es-ES" sz="2400" dirty="0">
+                <a:solidFill>
+                  <a:srgbClr val="FFFFFF"/>
+                </a:solidFill>
+                <a:latin typeface="Comic Sans MS" panose="030F0702030302020204" pitchFamily="66" charset="0"/>
+                <a:cs typeface="Arial" panose="020B0604020202020204" pitchFamily="34" charset="0"/>
+              </a:rPr>
+              <a:t>Proyecto final de Sistemas Distribuidos y Programación en Paralelo</a:t>
+            </a:r>
+            <a:endParaRPr lang="es-ES" dirty="0">
+              <a:solidFill>
+                <a:srgbClr val="FFFFFF"/>
+              </a:solidFill>
+              <a:latin typeface="Comic Sans MS" panose="030F0702030302020204" pitchFamily="66" charset="0"/>
+              <a:cs typeface="Arial" panose="020B0604020202020204" pitchFamily="34" charset="0"/>
+            </a:endParaRPr>
           </a:p>
         </p:txBody>
       </p:sp>
@@ -8335,26 +8369,65 @@
         </p:nvSpPr>
         <p:spPr>
           <a:xfrm>
-            <a:off x="944585" y="5494187"/>
-            <a:ext cx="5151415" cy="751470"/>
+            <a:off x="1290117" y="4795002"/>
+            <a:ext cx="5297189" cy="1128976"/>
           </a:xfrm>
         </p:spPr>
         <p:txBody>
           <a:bodyPr anchor="t">
-            <a:normAutofit/>
+            <a:normAutofit fontScale="92500" lnSpcReduction="20000"/>
           </a:bodyPr>
           <a:lstStyle/>
           <a:p>
             <a:pPr algn="l"/>
             <a:r>
-              <a:rPr lang="es-ES">
+              <a:rPr lang="es-ES" dirty="0">
                 <a:solidFill>
                   <a:srgbClr val="FFFFFF"/>
                 </a:solidFill>
                 <a:latin typeface="Arial Nova" panose="020F0502020204030204" pitchFamily="34" charset="0"/>
               </a:rPr>
-              <a:t>Almacén</a:t>
+              <a:t>Almacén :</a:t>
             </a:r>
+          </a:p>
+          <a:p>
+            <a:pPr algn="l"/>
+            <a:r>
+              <a:rPr lang="es-ES" dirty="0">
+                <a:solidFill>
+                  <a:srgbClr val="FFFFFF"/>
+                </a:solidFill>
+                <a:latin typeface="Arial Nova" panose="020F0502020204030204" pitchFamily="34" charset="0"/>
+              </a:rPr>
+              <a:t>Pablo ARCE DE ALDECOA</a:t>
+            </a:r>
+          </a:p>
+          <a:p>
+            <a:pPr algn="l"/>
+            <a:r>
+              <a:rPr lang="es-ES" dirty="0">
+                <a:solidFill>
+                  <a:srgbClr val="FFFFFF"/>
+                </a:solidFill>
+                <a:latin typeface="Arial Nova" panose="020F0502020204030204" pitchFamily="34" charset="0"/>
+              </a:rPr>
+              <a:t>Pablo Pérez </a:t>
+            </a:r>
+            <a:r>
+              <a:rPr lang="es-ES" dirty="0" err="1">
+                <a:solidFill>
+                  <a:srgbClr val="FFFFFF"/>
+                </a:solidFill>
+                <a:latin typeface="Arial Nova" panose="020F0502020204030204" pitchFamily="34" charset="0"/>
+              </a:rPr>
+              <a:t>martÍnez</a:t>
+            </a:r>
+            <a:endParaRPr lang="es-ES" dirty="0">
+              <a:solidFill>
+                <a:srgbClr val="FFFFFF"/>
+              </a:solidFill>
+              <a:latin typeface="Arial Nova" panose="020F0502020204030204" pitchFamily="34" charset="0"/>
+            </a:endParaRPr>
           </a:p>
         </p:txBody>
       </p:sp>
@@ -13839,8 +13912,8 @@
         </p:nvSpPr>
         <p:spPr>
           <a:xfrm>
-            <a:off x="1783307" y="-338806"/>
-            <a:ext cx="8625385" cy="2729554"/>
+            <a:off x="2782094" y="691577"/>
+            <a:ext cx="6627773" cy="962008"/>
           </a:xfrm>
         </p:spPr>
         <p:txBody>
@@ -13854,27 +13927,11 @@
                 <a:solidFill>
                   <a:srgbClr val="FFFFFF"/>
                 </a:solidFill>
-                <a:latin typeface="Arial" panose="020B0604020202020204" pitchFamily="34" charset="0"/>
+                <a:latin typeface="Comic Sans MS" panose="030F0702030302020204" pitchFamily="66" charset="0"/>
                 <a:cs typeface="Arial" panose="020B0604020202020204" pitchFamily="34" charset="0"/>
               </a:rPr>
               <a:t>Introducción</a:t>
             </a:r>
-            <a:br>
-              <a:rPr lang="es-ES" sz="4000" dirty="0">
-                <a:solidFill>
-                  <a:srgbClr val="FFFFFF"/>
-                </a:solidFill>
-                <a:latin typeface="Arial" panose="020B0604020202020204" pitchFamily="34" charset="0"/>
-                <a:cs typeface="Arial" panose="020B0604020202020204" pitchFamily="34" charset="0"/>
-              </a:rPr>
-            </a:br>
-            <a:endParaRPr lang="es-ES" sz="4000" dirty="0">
-              <a:solidFill>
-                <a:srgbClr val="FFFFFF"/>
-              </a:solidFill>
-              <a:latin typeface="Arial" panose="020B0604020202020204" pitchFamily="34" charset="0"/>
-              <a:cs typeface="Arial" panose="020B0604020202020204" pitchFamily="34" charset="0"/>
-            </a:endParaRPr>
           </a:p>
         </p:txBody>
       </p:sp>
@@ -13896,8 +13953,8 @@
         </p:nvSpPr>
         <p:spPr>
           <a:xfrm>
-            <a:off x="3429000" y="4572001"/>
-            <a:ext cx="5621721" cy="1400300"/>
+            <a:off x="1431388" y="1977994"/>
+            <a:ext cx="9358532" cy="4155520"/>
           </a:xfrm>
         </p:spPr>
         <p:txBody>
@@ -13918,8 +13975,73 @@
                 </a:solidFill>
                 <a:latin typeface="Arial Nova" panose="020F0502020204030204" pitchFamily="34" charset="0"/>
               </a:rPr>
-              <a:t>-BASE DE DATOS En SQL</a:t>
+              <a:t>-</a:t>
             </a:r>
+          </a:p>
+          <a:p>
+            <a:pPr algn="l">
+              <a:lnSpc>
+                <a:spcPct val="140000"/>
+              </a:lnSpc>
+            </a:pPr>
+            <a:endParaRPr lang="es-ES" dirty="0">
+              <a:solidFill>
+                <a:srgbClr val="FFFFFF"/>
+              </a:solidFill>
+              <a:latin typeface="Arial Nova" panose="020F0502020204030204" pitchFamily="34" charset="0"/>
+            </a:endParaRPr>
+          </a:p>
+          <a:p>
+            <a:pPr algn="l">
+              <a:lnSpc>
+                <a:spcPct val="140000"/>
+              </a:lnSpc>
+            </a:pPr>
+            <a:endParaRPr lang="es-ES" dirty="0">
+              <a:solidFill>
+                <a:srgbClr val="FFFFFF"/>
+              </a:solidFill>
+              <a:latin typeface="Arial Nova" panose="020F0502020204030204" pitchFamily="34" charset="0"/>
+            </a:endParaRPr>
+          </a:p>
+          <a:p>
+            <a:pPr algn="l">
+              <a:lnSpc>
+                <a:spcPct val="140000"/>
+              </a:lnSpc>
+            </a:pPr>
+            <a:endParaRPr lang="es-ES" dirty="0">
+              <a:solidFill>
+                <a:srgbClr val="FFFFFF"/>
+              </a:solidFill>
+              <a:latin typeface="Arial Nova" panose="020F0502020204030204" pitchFamily="34" charset="0"/>
+            </a:endParaRPr>
+          </a:p>
+          <a:p>
+            <a:pPr algn="l">
+              <a:lnSpc>
+                <a:spcPct val="140000"/>
+              </a:lnSpc>
+            </a:pPr>
+            <a:endParaRPr lang="es-ES" dirty="0">
+              <a:solidFill>
+                <a:srgbClr val="FFFFFF"/>
+              </a:solidFill>
+              <a:latin typeface="Arial Nova" panose="020F0502020204030204" pitchFamily="34" charset="0"/>
+            </a:endParaRPr>
+          </a:p>
+          <a:p>
+            <a:pPr algn="l">
+              <a:lnSpc>
+                <a:spcPct val="140000"/>
+              </a:lnSpc>
+            </a:pPr>
+            <a:endParaRPr lang="es-ES" dirty="0">
+              <a:solidFill>
+                <a:srgbClr val="FFFFFF"/>
+              </a:solidFill>
+              <a:latin typeface="Arial Nova" panose="020F0502020204030204" pitchFamily="34" charset="0"/>
+            </a:endParaRPr>
           </a:p>
           <a:p>
             <a:pPr algn="l">
@@ -13934,7 +14056,7 @@
                 </a:solidFill>
                 <a:latin typeface="Arial Nova" panose="020F0502020204030204" pitchFamily="34" charset="0"/>
               </a:rPr>
-              <a:t>-MODELO</a:t>
+              <a:t>-MODELO DE NEGOCIO</a:t>
             </a:r>
           </a:p>
           <a:p>
@@ -13943,15 +14065,12 @@
                 <a:spcPct val="140000"/>
               </a:lnSpc>
             </a:pPr>
-            <a:r>
-              <a:rPr lang="es-ES" dirty="0">
-                <a:solidFill>
-                  <a:srgbClr val="FFFFFF"/>
-                </a:solidFill>
-                <a:latin typeface="Arial Nova" panose="020F0502020204030204" pitchFamily="34" charset="0"/>
-              </a:rPr>
-              <a:t>		Producto</a:t>
-            </a:r>
+            <a:endParaRPr lang="es-ES" dirty="0">
+              <a:solidFill>
+                <a:srgbClr val="FFFFFF"/>
+              </a:solidFill>
+              <a:latin typeface="Arial Nova" panose="020F0502020204030204" pitchFamily="34" charset="0"/>
+            </a:endParaRPr>
           </a:p>
           <a:p>
             <a:pPr>
@@ -13968,6 +14087,81 @@
           </a:p>
         </p:txBody>
       </p:sp>
+      <p:pic>
+        <p:nvPicPr>
+          <p:cNvPr id="4" name="Gráfico 3">
+            <a:extLst>
+              <a:ext uri="{FF2B5EF4-FFF2-40B4-BE49-F238E27FC236}">
+                <a16:creationId xmlns:a16="http://schemas.microsoft.com/office/drawing/2014/main" id="{2DF79F78-4DDA-223A-80D3-394D985A68E5}"/>
+              </a:ext>
+            </a:extLst>
+          </p:cNvPr>
+          <p:cNvPicPr>
+            <a:picLocks noChangeAspect="1"/>
+          </p:cNvPicPr>
+          <p:nvPr/>
+        </p:nvPicPr>
+        <p:blipFill>
+          <a:blip r:embed="rId3">
+            <a:extLst>
+              <a:ext uri="{28A0092B-C50C-407E-A947-70E740481C1C}">
+                <a14:useLocalDpi xmlns:a14="http://schemas.microsoft.com/office/drawing/2010/main" val="0"/>
+              </a:ext>
+              <a:ext uri="{96DAC541-7B7A-43D3-8B79-37D633B846F1}">
+                <asvg:svgBlip xmlns:asvg="http://schemas.microsoft.com/office/drawing/2016/SVG/main" r:embed="rId4"/>
+              </a:ext>
+            </a:extLst>
+          </a:blip>
+          <a:stretch>
+            <a:fillRect/>
+          </a:stretch>
+        </p:blipFill>
+        <p:spPr>
+          <a:xfrm>
+            <a:off x="6096001" y="1011094"/>
+            <a:ext cx="4693924" cy="5519441"/>
+          </a:xfrm>
+          <a:prstGeom prst="rect">
+            <a:avLst/>
+          </a:prstGeom>
+        </p:spPr>
+      </p:pic>
+      <p:pic>
+        <p:nvPicPr>
+          <p:cNvPr id="6" name="Imagen 5" descr="Logotipo&#10;&#10;Descripción generada automáticamente">
+            <a:extLst>
+              <a:ext uri="{FF2B5EF4-FFF2-40B4-BE49-F238E27FC236}">
+                <a16:creationId xmlns:a16="http://schemas.microsoft.com/office/drawing/2014/main" id="{0C0625AF-0905-89F7-24CD-B49BF374FFA5}"/>
+              </a:ext>
+            </a:extLst>
+          </p:cNvPr>
+          <p:cNvPicPr>
+            <a:picLocks noChangeAspect="1"/>
+          </p:cNvPicPr>
+          <p:nvPr/>
+        </p:nvPicPr>
+        <p:blipFill>
+          <a:blip r:embed="rId5">
+            <a:extLst>
+              <a:ext uri="{28A0092B-C50C-407E-A947-70E740481C1C}">
+                <a14:useLocalDpi xmlns:a14="http://schemas.microsoft.com/office/drawing/2010/main" val="0"/>
+              </a:ext>
+            </a:extLst>
+          </a:blip>
+          <a:stretch>
+            <a:fillRect/>
+          </a:stretch>
+        </p:blipFill>
+        <p:spPr>
+          <a:xfrm>
+            <a:off x="1779417" y="1960954"/>
+            <a:ext cx="2537167" cy="1184011"/>
+          </a:xfrm>
+          <a:prstGeom prst="rect">
+            <a:avLst/>
+          </a:prstGeom>
+        </p:spPr>
+      </p:pic>
     </p:spTree>
     <p:extLst>
       <p:ext uri="{BB962C8B-B14F-4D97-AF65-F5344CB8AC3E}">
@@ -14217,8 +14411,8 @@
         </p:nvSpPr>
         <p:spPr>
           <a:xfrm>
-            <a:off x="1783307" y="-338806"/>
-            <a:ext cx="8625385" cy="2729554"/>
+            <a:off x="1699219" y="591806"/>
+            <a:ext cx="8208832" cy="966724"/>
           </a:xfrm>
         </p:spPr>
         <p:txBody>
@@ -14232,27 +14426,11 @@
                 <a:solidFill>
                   <a:srgbClr val="FFFFFF"/>
                 </a:solidFill>
-                <a:latin typeface="Arial" panose="020B0604020202020204" pitchFamily="34" charset="0"/>
+                <a:latin typeface="Comic Sans MS" panose="030F0702030302020204" pitchFamily="66" charset="0"/>
                 <a:cs typeface="Arial" panose="020B0604020202020204" pitchFamily="34" charset="0"/>
               </a:rPr>
-              <a:t>Realización</a:t>
+              <a:t>Realización I</a:t>
             </a:r>
-            <a:br>
-              <a:rPr lang="es-ES" sz="4000" dirty="0">
-                <a:solidFill>
-                  <a:srgbClr val="FFFFFF"/>
-                </a:solidFill>
-                <a:latin typeface="Arial" panose="020B0604020202020204" pitchFamily="34" charset="0"/>
-                <a:cs typeface="Arial" panose="020B0604020202020204" pitchFamily="34" charset="0"/>
-              </a:rPr>
-            </a:br>
-            <a:endParaRPr lang="es-ES" sz="4000" dirty="0">
-              <a:solidFill>
-                <a:srgbClr val="FFFFFF"/>
-              </a:solidFill>
-              <a:latin typeface="Arial" panose="020B0604020202020204" pitchFamily="34" charset="0"/>
-              <a:cs typeface="Arial" panose="020B0604020202020204" pitchFamily="34" charset="0"/>
-            </a:endParaRPr>
           </a:p>
         </p:txBody>
       </p:sp>
@@ -14274,8 +14452,8 @@
         </p:nvSpPr>
         <p:spPr>
           <a:xfrm>
-            <a:off x="3141258" y="4680867"/>
-            <a:ext cx="5909481" cy="811373"/>
+            <a:off x="1544475" y="1645407"/>
+            <a:ext cx="7427247" cy="2583007"/>
           </a:xfrm>
         </p:spPr>
         <p:txBody>
@@ -14296,8 +14474,60 @@
                 </a:solidFill>
                 <a:latin typeface="Arial Nova" panose="020F0502020204030204" pitchFamily="34" charset="0"/>
               </a:rPr>
-              <a:t>.BACK:</a:t>
+              <a:t>.FRONT:</a:t>
             </a:r>
+          </a:p>
+          <a:p>
+            <a:pPr algn="l">
+              <a:lnSpc>
+                <a:spcPct val="140000"/>
+              </a:lnSpc>
+            </a:pPr>
+            <a:endParaRPr lang="es-ES" sz="7200" dirty="0">
+              <a:solidFill>
+                <a:srgbClr val="FFFFFF"/>
+              </a:solidFill>
+              <a:latin typeface="Arial Nova" panose="020F0502020204030204" pitchFamily="34" charset="0"/>
+            </a:endParaRPr>
+          </a:p>
+          <a:p>
+            <a:pPr algn="l">
+              <a:lnSpc>
+                <a:spcPct val="140000"/>
+              </a:lnSpc>
+            </a:pPr>
+            <a:endParaRPr lang="es-ES" sz="7200" dirty="0">
+              <a:solidFill>
+                <a:srgbClr val="FFFFFF"/>
+              </a:solidFill>
+              <a:latin typeface="Arial Nova" panose="020F0502020204030204" pitchFamily="34" charset="0"/>
+            </a:endParaRPr>
+          </a:p>
+          <a:p>
+            <a:pPr algn="l">
+              <a:lnSpc>
+                <a:spcPct val="140000"/>
+              </a:lnSpc>
+            </a:pPr>
+            <a:endParaRPr lang="es-ES" sz="7200" dirty="0">
+              <a:solidFill>
+                <a:srgbClr val="FFFFFF"/>
+              </a:solidFill>
+              <a:latin typeface="Arial Nova" panose="020F0502020204030204" pitchFamily="34" charset="0"/>
+            </a:endParaRPr>
+          </a:p>
+          <a:p>
+            <a:pPr algn="l">
+              <a:lnSpc>
+                <a:spcPct val="140000"/>
+              </a:lnSpc>
+            </a:pPr>
+            <a:endParaRPr lang="es-ES" sz="7200" dirty="0">
+              <a:solidFill>
+                <a:srgbClr val="FFFFFF"/>
+              </a:solidFill>
+              <a:latin typeface="Arial Nova" panose="020F0502020204030204" pitchFamily="34" charset="0"/>
+            </a:endParaRPr>
           </a:p>
           <a:p>
             <a:pPr algn="l">
@@ -14312,97 +14542,191 @@
                 </a:solidFill>
                 <a:latin typeface="Arial Nova" panose="020F0502020204030204" pitchFamily="34" charset="0"/>
               </a:rPr>
-              <a:t>	- </a:t>
-            </a:r>
-            <a:r>
-              <a:rPr lang="es-ES" sz="7200" dirty="0" err="1">
-                <a:solidFill>
-                  <a:srgbClr val="FFFFFF"/>
-                </a:solidFill>
-                <a:latin typeface="Arial Nova" panose="020F0502020204030204" pitchFamily="34" charset="0"/>
-              </a:rPr>
-              <a:t>microsoft</a:t>
-            </a:r>
-            <a:r>
-              <a:rPr lang="es-ES" sz="7200" dirty="0">
-                <a:solidFill>
-                  <a:srgbClr val="FFFFFF"/>
-                </a:solidFill>
-                <a:latin typeface="Arial Nova" panose="020F0502020204030204" pitchFamily="34" charset="0"/>
-              </a:rPr>
-              <a:t> </a:t>
-            </a:r>
-            <a:r>
-              <a:rPr lang="es-ES" sz="7200" dirty="0" err="1">
-                <a:solidFill>
-                  <a:srgbClr val="FFFFFF"/>
-                </a:solidFill>
-                <a:latin typeface="Arial Nova" panose="020F0502020204030204" pitchFamily="34" charset="0"/>
-              </a:rPr>
-              <a:t>sql</a:t>
-            </a:r>
-            <a:r>
-              <a:rPr lang="es-ES" sz="7200" dirty="0">
-                <a:solidFill>
-                  <a:srgbClr val="FFFFFF"/>
-                </a:solidFill>
-                <a:latin typeface="Arial Nova" panose="020F0502020204030204" pitchFamily="34" charset="0"/>
-              </a:rPr>
-              <a:t> server</a:t>
-            </a:r>
-          </a:p>
-          <a:p>
-            <a:pPr algn="l">
-              <a:lnSpc>
-                <a:spcPct val="140000"/>
-              </a:lnSpc>
-            </a:pPr>
-            <a:r>
-              <a:rPr lang="es-ES" sz="7200" dirty="0">
-                <a:solidFill>
-                  <a:srgbClr val="FFFFFF"/>
-                </a:solidFill>
-                <a:latin typeface="Arial Nova" panose="020F0502020204030204" pitchFamily="34" charset="0"/>
-              </a:rPr>
-              <a:t>	- </a:t>
-            </a:r>
-            <a:r>
-              <a:rPr lang="es-ES" sz="7200" dirty="0" err="1">
-                <a:solidFill>
-                  <a:srgbClr val="FFFFFF"/>
-                </a:solidFill>
-                <a:latin typeface="Arial Nova" panose="020F0502020204030204" pitchFamily="34" charset="0"/>
-              </a:rPr>
-              <a:t>.net</a:t>
-            </a:r>
-            <a:r>
-              <a:rPr lang="es-ES" sz="7200" dirty="0">
-                <a:solidFill>
-                  <a:srgbClr val="FFFFFF"/>
-                </a:solidFill>
-                <a:latin typeface="Arial Nova" panose="020F0502020204030204" pitchFamily="34" charset="0"/>
-              </a:rPr>
-              <a:t> Framework</a:t>
-            </a:r>
-          </a:p>
-          <a:p>
-            <a:pPr algn="l">
-              <a:lnSpc>
-                <a:spcPct val="140000"/>
-              </a:lnSpc>
-            </a:pPr>
-            <a:r>
-              <a:rPr lang="es-ES" sz="7200" dirty="0">
-                <a:solidFill>
-                  <a:srgbClr val="FFFFFF"/>
-                </a:solidFill>
-                <a:latin typeface="Arial Nova" panose="020F0502020204030204" pitchFamily="34" charset="0"/>
-              </a:rPr>
-              <a:t>.FRONT</a:t>
+              <a:t>.</a:t>
             </a:r>
           </a:p>
         </p:txBody>
       </p:sp>
+      <p:pic>
+        <p:nvPicPr>
+          <p:cNvPr id="5" name="Imagen 4" descr="Logotipo, nombre de la empresa&#10;&#10;Descripción generada automáticamente">
+            <a:extLst>
+              <a:ext uri="{FF2B5EF4-FFF2-40B4-BE49-F238E27FC236}">
+                <a16:creationId xmlns:a16="http://schemas.microsoft.com/office/drawing/2014/main" id="{AC7E2647-B15E-05C6-6D1A-BF03F453F93F}"/>
+              </a:ext>
+            </a:extLst>
+          </p:cNvPr>
+          <p:cNvPicPr>
+            <a:picLocks noChangeAspect="1"/>
+          </p:cNvPicPr>
+          <p:nvPr/>
+        </p:nvPicPr>
+        <p:blipFill>
+          <a:blip r:embed="rId3">
+            <a:extLst>
+              <a:ext uri="{28A0092B-C50C-407E-A947-70E740481C1C}">
+                <a14:useLocalDpi xmlns:a14="http://schemas.microsoft.com/office/drawing/2010/main" val="0"/>
+              </a:ext>
+            </a:extLst>
+          </a:blip>
+          <a:stretch>
+            <a:fillRect/>
+          </a:stretch>
+        </p:blipFill>
+        <p:spPr>
+          <a:xfrm>
+            <a:off x="2309827" y="2113382"/>
+            <a:ext cx="2534085" cy="1454196"/>
+          </a:xfrm>
+          <a:prstGeom prst="rect">
+            <a:avLst/>
+          </a:prstGeom>
+        </p:spPr>
+      </p:pic>
+      <p:pic>
+        <p:nvPicPr>
+          <p:cNvPr id="7" name="Imagen 6" descr="Imagen que contiene dibujo&#10;&#10;Descripción generada automáticamente">
+            <a:extLst>
+              <a:ext uri="{FF2B5EF4-FFF2-40B4-BE49-F238E27FC236}">
+                <a16:creationId xmlns:a16="http://schemas.microsoft.com/office/drawing/2014/main" id="{AF8C24A2-9B9A-6A53-9E23-B9FC62F036F2}"/>
+              </a:ext>
+            </a:extLst>
+          </p:cNvPr>
+          <p:cNvPicPr>
+            <a:picLocks noChangeAspect="1"/>
+          </p:cNvPicPr>
+          <p:nvPr/>
+        </p:nvPicPr>
+        <p:blipFill>
+          <a:blip r:embed="rId4">
+            <a:extLst>
+              <a:ext uri="{28A0092B-C50C-407E-A947-70E740481C1C}">
+                <a14:useLocalDpi xmlns:a14="http://schemas.microsoft.com/office/drawing/2010/main" val="0"/>
+              </a:ext>
+            </a:extLst>
+          </a:blip>
+          <a:stretch>
+            <a:fillRect/>
+          </a:stretch>
+        </p:blipFill>
+        <p:spPr>
+          <a:xfrm>
+            <a:off x="7873260" y="2205258"/>
+            <a:ext cx="2534085" cy="1451231"/>
+          </a:xfrm>
+          <a:prstGeom prst="rect">
+            <a:avLst/>
+          </a:prstGeom>
+        </p:spPr>
+      </p:pic>
+      <p:pic>
+        <p:nvPicPr>
+          <p:cNvPr id="9" name="Imagen 8" descr="Interfaz de usuario gráfica&#10;&#10;Descripción generada automáticamente">
+            <a:extLst>
+              <a:ext uri="{FF2B5EF4-FFF2-40B4-BE49-F238E27FC236}">
+                <a16:creationId xmlns:a16="http://schemas.microsoft.com/office/drawing/2014/main" id="{2109CE1E-E2B4-EB70-63DA-618168856CCE}"/>
+              </a:ext>
+            </a:extLst>
+          </p:cNvPr>
+          <p:cNvPicPr>
+            <a:picLocks noChangeAspect="1"/>
+          </p:cNvPicPr>
+          <p:nvPr/>
+        </p:nvPicPr>
+        <p:blipFill>
+          <a:blip r:embed="rId5">
+            <a:extLst>
+              <a:ext uri="{28A0092B-C50C-407E-A947-70E740481C1C}">
+                <a14:useLocalDpi xmlns:a14="http://schemas.microsoft.com/office/drawing/2010/main" val="0"/>
+              </a:ext>
+            </a:extLst>
+          </a:blip>
+          <a:stretch>
+            <a:fillRect/>
+          </a:stretch>
+        </p:blipFill>
+        <p:spPr>
+          <a:xfrm>
+            <a:off x="2309827" y="4817591"/>
+            <a:ext cx="2542301" cy="1451232"/>
+          </a:xfrm>
+          <a:prstGeom prst="rect">
+            <a:avLst/>
+          </a:prstGeom>
+        </p:spPr>
+      </p:pic>
+      <p:pic>
+        <p:nvPicPr>
+          <p:cNvPr id="11" name="Imagen 10" descr="Logotipo&#10;&#10;Descripción generada automáticamente">
+            <a:extLst>
+              <a:ext uri="{FF2B5EF4-FFF2-40B4-BE49-F238E27FC236}">
+                <a16:creationId xmlns:a16="http://schemas.microsoft.com/office/drawing/2014/main" id="{27D19413-741C-9971-3C28-2EFD1E460BA4}"/>
+              </a:ext>
+            </a:extLst>
+          </p:cNvPr>
+          <p:cNvPicPr>
+            <a:picLocks noChangeAspect="1"/>
+          </p:cNvPicPr>
+          <p:nvPr/>
+        </p:nvPicPr>
+        <p:blipFill>
+          <a:blip r:embed="rId6">
+            <a:extLst>
+              <a:ext uri="{28A0092B-C50C-407E-A947-70E740481C1C}">
+                <a14:useLocalDpi xmlns:a14="http://schemas.microsoft.com/office/drawing/2010/main" val="0"/>
+              </a:ext>
+            </a:extLst>
+          </a:blip>
+          <a:stretch>
+            <a:fillRect/>
+          </a:stretch>
+        </p:blipFill>
+        <p:spPr>
+          <a:xfrm>
+            <a:off x="7873260" y="4833993"/>
+            <a:ext cx="2534085" cy="1418427"/>
+          </a:xfrm>
+          <a:prstGeom prst="rect">
+            <a:avLst/>
+          </a:prstGeom>
+        </p:spPr>
+      </p:pic>
+      <p:pic>
+        <p:nvPicPr>
+          <p:cNvPr id="13" name="Imagen 12" descr="Logotipo, nombre de la empresa&#10;&#10;Descripción generada automáticamente">
+            <a:extLst>
+              <a:ext uri="{FF2B5EF4-FFF2-40B4-BE49-F238E27FC236}">
+                <a16:creationId xmlns:a16="http://schemas.microsoft.com/office/drawing/2014/main" id="{1530284D-5A43-B565-6AF5-A884A26DAB9B}"/>
+              </a:ext>
+            </a:extLst>
+          </p:cNvPr>
+          <p:cNvPicPr>
+            <a:picLocks noChangeAspect="1"/>
+          </p:cNvPicPr>
+          <p:nvPr/>
+        </p:nvPicPr>
+        <p:blipFill>
+          <a:blip r:embed="rId7">
+            <a:extLst>
+              <a:ext uri="{28A0092B-C50C-407E-A947-70E740481C1C}">
+                <a14:useLocalDpi xmlns:a14="http://schemas.microsoft.com/office/drawing/2010/main" val="0"/>
+              </a:ext>
+            </a:extLst>
+          </a:blip>
+          <a:stretch>
+            <a:fillRect/>
+          </a:stretch>
+        </p:blipFill>
+        <p:spPr>
+          <a:xfrm>
+            <a:off x="5048551" y="3429000"/>
+            <a:ext cx="2633472" cy="1441292"/>
+          </a:xfrm>
+          <a:prstGeom prst="rect">
+            <a:avLst/>
+          </a:prstGeom>
+        </p:spPr>
+      </p:pic>
     </p:spTree>
     <p:extLst>
       <p:ext uri="{BB962C8B-B14F-4D97-AF65-F5344CB8AC3E}">
@@ -14538,7 +14862,7 @@
         </p:blipFill>
         <p:spPr>
           <a:xfrm>
-            <a:off x="-1" y="-7938"/>
+            <a:off x="20" y="10"/>
             <a:ext cx="12191962" cy="6857990"/>
           </a:xfrm>
           <a:prstGeom prst="rect">
@@ -14652,8 +14976,8 @@
         </p:nvSpPr>
         <p:spPr>
           <a:xfrm>
-            <a:off x="1783307" y="-338806"/>
-            <a:ext cx="8625385" cy="2729554"/>
+            <a:off x="1741422" y="592025"/>
+            <a:ext cx="8208832" cy="966724"/>
           </a:xfrm>
         </p:spPr>
         <p:txBody>
@@ -14663,40 +14987,24 @@
           <a:lstStyle/>
           <a:p>
             <a:r>
-              <a:rPr lang="es-ES" sz="4000">
+              <a:rPr lang="es-ES" sz="4000" dirty="0">
                 <a:solidFill>
                   <a:srgbClr val="FFFFFF"/>
                 </a:solidFill>
-                <a:latin typeface="Arial" panose="020B0604020202020204" pitchFamily="34" charset="0"/>
+                <a:latin typeface="Comic Sans MS" panose="030F0702030302020204" pitchFamily="66" charset="0"/>
                 <a:cs typeface="Arial" panose="020B0604020202020204" pitchFamily="34" charset="0"/>
               </a:rPr>
-              <a:t>Modelo de Negocio</a:t>
+              <a:t>Realización II</a:t>
             </a:r>
-            <a:br>
-              <a:rPr lang="es-ES" sz="4000">
-                <a:solidFill>
-                  <a:srgbClr val="FFFFFF"/>
-                </a:solidFill>
-                <a:latin typeface="Arial" panose="020B0604020202020204" pitchFamily="34" charset="0"/>
-                <a:cs typeface="Arial" panose="020B0604020202020204" pitchFamily="34" charset="0"/>
-              </a:rPr>
-            </a:br>
-            <a:endParaRPr lang="es-ES" sz="4000" dirty="0">
-              <a:solidFill>
-                <a:srgbClr val="FFFFFF"/>
-              </a:solidFill>
-              <a:latin typeface="Arial" panose="020B0604020202020204" pitchFamily="34" charset="0"/>
-              <a:cs typeface="Arial" panose="020B0604020202020204" pitchFamily="34" charset="0"/>
-            </a:endParaRPr>
           </a:p>
         </p:txBody>
       </p:sp>
       <p:sp>
         <p:nvSpPr>
-          <p:cNvPr id="5" name="Subtítulo 4">
+          <p:cNvPr id="3" name="Subtítulo 2">
             <a:extLst>
               <a:ext uri="{FF2B5EF4-FFF2-40B4-BE49-F238E27FC236}">
-                <a16:creationId xmlns:a16="http://schemas.microsoft.com/office/drawing/2014/main" id="{3D282D7F-F4F4-8FCC-0592-E756203491BA}"/>
+                <a16:creationId xmlns:a16="http://schemas.microsoft.com/office/drawing/2014/main" id="{C59C9867-9C4E-DC87-82FC-880AEEBB93E2}"/>
               </a:ext>
             </a:extLst>
           </p:cNvPr>
@@ -14709,24 +15017,107 @@
         </p:nvSpPr>
         <p:spPr>
           <a:xfrm>
-            <a:off x="2898715" y="751910"/>
-            <a:ext cx="5993892" cy="1166495"/>
+            <a:off x="1544475" y="1645407"/>
+            <a:ext cx="7427247" cy="2583007"/>
           </a:xfrm>
         </p:spPr>
         <p:txBody>
-          <a:bodyPr/>
+          <a:bodyPr>
+            <a:normAutofit fontScale="25000" lnSpcReduction="20000"/>
+          </a:bodyPr>
           <a:lstStyle/>
           <a:p>
-            <a:endParaRPr lang="es-ES" dirty="0"/>
+            <a:pPr algn="l">
+              <a:lnSpc>
+                <a:spcPct val="140000"/>
+              </a:lnSpc>
+            </a:pPr>
+            <a:r>
+              <a:rPr lang="es-ES" sz="7200" dirty="0">
+                <a:solidFill>
+                  <a:srgbClr val="FFFFFF"/>
+                </a:solidFill>
+                <a:latin typeface="Arial Nova" panose="020F0502020204030204" pitchFamily="34" charset="0"/>
+              </a:rPr>
+              <a:t>.BACK:</a:t>
+            </a:r>
+          </a:p>
+          <a:p>
+            <a:pPr algn="l">
+              <a:lnSpc>
+                <a:spcPct val="140000"/>
+              </a:lnSpc>
+            </a:pPr>
+            <a:endParaRPr lang="es-ES" sz="7200" dirty="0">
+              <a:solidFill>
+                <a:srgbClr val="FFFFFF"/>
+              </a:solidFill>
+              <a:latin typeface="Arial Nova" panose="020F0502020204030204" pitchFamily="34" charset="0"/>
+            </a:endParaRPr>
+          </a:p>
+          <a:p>
+            <a:pPr algn="l">
+              <a:lnSpc>
+                <a:spcPct val="140000"/>
+              </a:lnSpc>
+            </a:pPr>
+            <a:endParaRPr lang="es-ES" sz="7200" dirty="0">
+              <a:solidFill>
+                <a:srgbClr val="FFFFFF"/>
+              </a:solidFill>
+              <a:latin typeface="Arial Nova" panose="020F0502020204030204" pitchFamily="34" charset="0"/>
+            </a:endParaRPr>
+          </a:p>
+          <a:p>
+            <a:pPr algn="l">
+              <a:lnSpc>
+                <a:spcPct val="140000"/>
+              </a:lnSpc>
+            </a:pPr>
+            <a:endParaRPr lang="es-ES" sz="7200" dirty="0">
+              <a:solidFill>
+                <a:srgbClr val="FFFFFF"/>
+              </a:solidFill>
+              <a:latin typeface="Arial Nova" panose="020F0502020204030204" pitchFamily="34" charset="0"/>
+            </a:endParaRPr>
+          </a:p>
+          <a:p>
+            <a:pPr algn="l">
+              <a:lnSpc>
+                <a:spcPct val="140000"/>
+              </a:lnSpc>
+            </a:pPr>
+            <a:endParaRPr lang="es-ES" sz="7200" dirty="0">
+              <a:solidFill>
+                <a:srgbClr val="FFFFFF"/>
+              </a:solidFill>
+              <a:latin typeface="Arial Nova" panose="020F0502020204030204" pitchFamily="34" charset="0"/>
+            </a:endParaRPr>
+          </a:p>
+          <a:p>
+            <a:pPr algn="l">
+              <a:lnSpc>
+                <a:spcPct val="140000"/>
+              </a:lnSpc>
+            </a:pPr>
+            <a:r>
+              <a:rPr lang="es-ES" sz="7200" dirty="0">
+                <a:solidFill>
+                  <a:srgbClr val="FFFFFF"/>
+                </a:solidFill>
+                <a:latin typeface="Arial Nova" panose="020F0502020204030204" pitchFamily="34" charset="0"/>
+              </a:rPr>
+              <a:t>.</a:t>
+            </a:r>
           </a:p>
         </p:txBody>
       </p:sp>
       <p:pic>
         <p:nvPicPr>
-          <p:cNvPr id="7" name="Gráfico 6">
+          <p:cNvPr id="10" name="Imagen 9" descr="Logotipo, nombre de la empresa&#10;&#10;Descripción generada automáticamente">
             <a:extLst>
               <a:ext uri="{FF2B5EF4-FFF2-40B4-BE49-F238E27FC236}">
-                <a16:creationId xmlns:a16="http://schemas.microsoft.com/office/drawing/2014/main" id="{D98D0202-F135-27B2-F17E-3CB1C934F074}"/>
+                <a16:creationId xmlns:a16="http://schemas.microsoft.com/office/drawing/2014/main" id="{42797752-5D47-53EF-D223-E382181335D9}"/>
               </a:ext>
             </a:extLst>
           </p:cNvPr>
@@ -14741,8 +15132,41 @@
               <a:ext uri="{28A0092B-C50C-407E-A947-70E740481C1C}">
                 <a14:useLocalDpi xmlns:a14="http://schemas.microsoft.com/office/drawing/2010/main" val="0"/>
               </a:ext>
-              <a:ext uri="{96DAC541-7B7A-43D3-8B79-37D633B846F1}">
-                <asvg:svgBlip xmlns:asvg="http://schemas.microsoft.com/office/drawing/2016/SVG/main" r:embed="rId4"/>
+            </a:extLst>
+          </a:blip>
+          <a:stretch>
+            <a:fillRect/>
+          </a:stretch>
+        </p:blipFill>
+        <p:spPr>
+          <a:xfrm>
+            <a:off x="2106175" y="2279567"/>
+            <a:ext cx="4477505" cy="1948847"/>
+          </a:xfrm>
+          <a:prstGeom prst="rect">
+            <a:avLst/>
+          </a:prstGeom>
+        </p:spPr>
+      </p:pic>
+      <p:pic>
+        <p:nvPicPr>
+          <p:cNvPr id="14" name="Imagen 13" descr="Dibujo con letras blancas&#10;&#10;Descripción generada automáticamente con confianza media">
+            <a:extLst>
+              <a:ext uri="{FF2B5EF4-FFF2-40B4-BE49-F238E27FC236}">
+                <a16:creationId xmlns:a16="http://schemas.microsoft.com/office/drawing/2014/main" id="{79B79F3A-41C0-BE42-2477-453F35A1B1E7}"/>
+              </a:ext>
+            </a:extLst>
+          </p:cNvPr>
+          <p:cNvPicPr>
+            <a:picLocks noChangeAspect="1"/>
+          </p:cNvPicPr>
+          <p:nvPr/>
+        </p:nvPicPr>
+        <p:blipFill>
+          <a:blip r:embed="rId4">
+            <a:extLst>
+              <a:ext uri="{28A0092B-C50C-407E-A947-70E740481C1C}">
+                <a14:useLocalDpi xmlns:a14="http://schemas.microsoft.com/office/drawing/2010/main" val="0"/>
               </a:ext>
             </a:extLst>
           </a:blip>
@@ -14752,8 +15176,8 @@
         </p:blipFill>
         <p:spPr>
           <a:xfrm>
-            <a:off x="3767118" y="1611035"/>
-            <a:ext cx="4657725" cy="5476875"/>
+            <a:off x="5258098" y="4315072"/>
+            <a:ext cx="5871452" cy="1542963"/>
           </a:xfrm>
           <a:prstGeom prst="rect">
             <a:avLst/>
@@ -14763,7 +15187,7 @@
     </p:spTree>
     <p:extLst>
       <p:ext uri="{BB962C8B-B14F-4D97-AF65-F5344CB8AC3E}">
-        <p14:creationId xmlns:p14="http://schemas.microsoft.com/office/powerpoint/2010/main" val="1821530462"/>
+        <p14:creationId xmlns:p14="http://schemas.microsoft.com/office/powerpoint/2010/main" val="3941642930"/>
       </p:ext>
     </p:extLst>
   </p:cSld>

</xml_diff>